<commit_message>
small edit to the pptx
small edit to the pptx
</commit_message>
<xml_diff>
--- a/DA381A-Project_Presentation.pptx
+++ b/DA381A-Project_Presentation.pptx
@@ -13052,6 +13052,58 @@
           </a:prstGeom>
         </p:spPr>
       </p:pic>
+      <p:sp>
+        <p:nvSpPr>
+          <p:cNvPr id="4" name="Rectangle 3">
+            <a:extLst>
+              <a:ext uri="{FF2B5EF4-FFF2-40B4-BE49-F238E27FC236}">
+                <a16:creationId xmlns:a16="http://schemas.microsoft.com/office/drawing/2014/main" id="{6D81A999-462A-5E6A-8127-B0EB6A95F872}"/>
+              </a:ext>
+            </a:extLst>
+          </p:cNvPr>
+          <p:cNvSpPr/>
+          <p:nvPr/>
+        </p:nvSpPr>
+        <p:spPr>
+          <a:xfrm>
+            <a:off x="9162288" y="3060192"/>
+            <a:ext cx="1652705" cy="177337"/>
+          </a:xfrm>
+          <a:prstGeom prst="rect">
+            <a:avLst/>
+          </a:prstGeom>
+          <a:solidFill>
+            <a:srgbClr val="35363A"/>
+          </a:solidFill>
+          <a:ln>
+            <a:noFill/>
+          </a:ln>
+        </p:spPr>
+        <p:style>
+          <a:lnRef idx="2">
+            <a:schemeClr val="accent1">
+              <a:shade val="50000"/>
+            </a:schemeClr>
+          </a:lnRef>
+          <a:fillRef idx="1">
+            <a:schemeClr val="accent1"/>
+          </a:fillRef>
+          <a:effectRef idx="0">
+            <a:schemeClr val="accent1"/>
+          </a:effectRef>
+          <a:fontRef idx="minor">
+            <a:schemeClr val="lt1"/>
+          </a:fontRef>
+        </p:style>
+        <p:txBody>
+          <a:bodyPr rtlCol="0" anchor="ctr"/>
+          <a:lstStyle/>
+          <a:p>
+            <a:pPr algn="ctr"/>
+            <a:endParaRPr lang="en-GB"/>
+          </a:p>
+        </p:txBody>
+      </p:sp>
     </p:spTree>
     <p:extLst>
       <p:ext uri="{BB962C8B-B14F-4D97-AF65-F5344CB8AC3E}">

</xml_diff>